<commit_message>
Updates and removing unnecesary file
</commit_message>
<xml_diff>
--- a/Output/Stranding Data Analysis.pptx
+++ b/Output/Stranding Data Analysis.pptx
@@ -5379,6 +5379,42 @@
           <a:chExt cx="0" cy="0"/>
         </a:xfrm>
       </p:grpSpPr>
+      <p:pic>
+        <p:nvPicPr>
+          <p:cNvPr id="3" name="Picture 2">
+            <a:extLst>
+              <a:ext uri="{FF2B5EF4-FFF2-40B4-BE49-F238E27FC236}">
+                <a16:creationId xmlns:a16="http://schemas.microsoft.com/office/drawing/2014/main" id="{BE060579-CC06-4AD3-93A4-E40CE90E7085}"/>
+              </a:ext>
+            </a:extLst>
+          </p:cNvPr>
+          <p:cNvPicPr>
+            <a:picLocks noChangeAspect="1"/>
+          </p:cNvPicPr>
+          <p:nvPr/>
+        </p:nvPicPr>
+        <p:blipFill>
+          <a:blip r:embed="rId2">
+            <a:extLst>
+              <a:ext uri="{28A0092B-C50C-407E-A947-70E740481C1C}">
+                <a14:useLocalDpi xmlns:a14="http://schemas.microsoft.com/office/drawing/2010/main" val="0"/>
+              </a:ext>
+            </a:extLst>
+          </a:blip>
+          <a:stretch>
+            <a:fillRect/>
+          </a:stretch>
+        </p:blipFill>
+        <p:spPr>
+          <a:xfrm>
+            <a:off x="1106103" y="350817"/>
+            <a:ext cx="9979794" cy="6156366"/>
+          </a:xfrm>
+          <a:prstGeom prst="rect">
+            <a:avLst/>
+          </a:prstGeom>
+        </p:spPr>
+      </p:pic>
     </p:spTree>
     <p:extLst>
       <p:ext uri="{BB962C8B-B14F-4D97-AF65-F5344CB8AC3E}">

</xml_diff>

<commit_message>
britney's graphs added :)
</commit_message>
<xml_diff>
--- a/Output/Stranding Data Analysis.pptx
+++ b/Output/Stranding Data Analysis.pptx
@@ -4782,6 +4782,42 @@
           <a:xfrm>
             <a:off x="0" y="0"/>
             <a:ext cx="5486400" cy="3387634"/>
+          </a:xfrm>
+          <a:prstGeom prst="rect">
+            <a:avLst/>
+          </a:prstGeom>
+        </p:spPr>
+      </p:pic>
+      <p:pic>
+        <p:nvPicPr>
+          <p:cNvPr id="3" name="Picture 2" descr="Chart, bar chart&#10;&#10;Description automatically generated">
+            <a:extLst>
+              <a:ext uri="{FF2B5EF4-FFF2-40B4-BE49-F238E27FC236}">
+                <a16:creationId xmlns:a16="http://schemas.microsoft.com/office/drawing/2014/main" id="{076D4E72-8EF5-3347-996C-A9C8BFECEC63}"/>
+              </a:ext>
+            </a:extLst>
+          </p:cNvPr>
+          <p:cNvPicPr>
+            <a:picLocks noChangeAspect="1"/>
+          </p:cNvPicPr>
+          <p:nvPr/>
+        </p:nvPicPr>
+        <p:blipFill>
+          <a:blip r:embed="rId3">
+            <a:extLst>
+              <a:ext uri="{28A0092B-C50C-407E-A947-70E740481C1C}">
+                <a14:useLocalDpi xmlns:a14="http://schemas.microsoft.com/office/drawing/2010/main" val="0"/>
+              </a:ext>
+            </a:extLst>
+          </a:blip>
+          <a:stretch>
+            <a:fillRect/>
+          </a:stretch>
+        </p:blipFill>
+        <p:spPr>
+          <a:xfrm>
+            <a:off x="5578896" y="1513490"/>
+            <a:ext cx="6592084" cy="4070350"/>
           </a:xfrm>
           <a:prstGeom prst="rect">
             <a:avLst/>
@@ -6051,6 +6087,42 @@
           <a:xfrm>
             <a:off x="1" y="3447599"/>
             <a:ext cx="5528440" cy="3410400"/>
+          </a:xfrm>
+          <a:prstGeom prst="rect">
+            <a:avLst/>
+          </a:prstGeom>
+        </p:spPr>
+      </p:pic>
+      <p:pic>
+        <p:nvPicPr>
+          <p:cNvPr id="5" name="Picture 4" descr="Chart, line chart&#10;&#10;Description automatically generated">
+            <a:extLst>
+              <a:ext uri="{FF2B5EF4-FFF2-40B4-BE49-F238E27FC236}">
+                <a16:creationId xmlns:a16="http://schemas.microsoft.com/office/drawing/2014/main" id="{6255CE63-46FB-E844-AACF-C54B6A78A2DE}"/>
+              </a:ext>
+            </a:extLst>
+          </p:cNvPr>
+          <p:cNvPicPr>
+            <a:picLocks noChangeAspect="1"/>
+          </p:cNvPicPr>
+          <p:nvPr/>
+        </p:nvPicPr>
+        <p:blipFill>
+          <a:blip r:embed="rId4">
+            <a:extLst>
+              <a:ext uri="{28A0092B-C50C-407E-A947-70E740481C1C}">
+                <a14:useLocalDpi xmlns:a14="http://schemas.microsoft.com/office/drawing/2010/main" val="0"/>
+              </a:ext>
+            </a:extLst>
+          </a:blip>
+          <a:stretch>
+            <a:fillRect/>
+          </a:stretch>
+        </p:blipFill>
+        <p:spPr>
+          <a:xfrm>
+            <a:off x="5559393" y="1576552"/>
+            <a:ext cx="6632606" cy="4101882"/>
           </a:xfrm>
           <a:prstGeom prst="rect">
             <a:avLst/>

</xml_diff>

<commit_message>
editing data, results, and summary slides
</commit_message>
<xml_diff>
--- a/Output/Stranding Data Analysis.pptx
+++ b/Output/Stranding Data Analysis.pptx
@@ -5,10 +5,10 @@
     <p:sldMasterId id="2147483756" r:id="rId1"/>
   </p:sldMasterIdLst>
   <p:notesMasterIdLst>
-    <p:notesMasterId r:id="rId14"/>
+    <p:notesMasterId r:id="rId13"/>
   </p:notesMasterIdLst>
   <p:handoutMasterIdLst>
-    <p:handoutMasterId r:id="rId15"/>
+    <p:handoutMasterId r:id="rId14"/>
   </p:handoutMasterIdLst>
   <p:sldIdLst>
     <p:sldId id="259" r:id="rId2"/>
@@ -18,11 +18,10 @@
     <p:sldId id="261" r:id="rId6"/>
     <p:sldId id="262" r:id="rId7"/>
     <p:sldId id="264" r:id="rId8"/>
-    <p:sldId id="266" r:id="rId9"/>
-    <p:sldId id="267" r:id="rId10"/>
-    <p:sldId id="270" r:id="rId11"/>
-    <p:sldId id="273" r:id="rId12"/>
-    <p:sldId id="274" r:id="rId13"/>
+    <p:sldId id="267" r:id="rId9"/>
+    <p:sldId id="270" r:id="rId10"/>
+    <p:sldId id="275" r:id="rId11"/>
+    <p:sldId id="274" r:id="rId12"/>
   </p:sldIdLst>
   <p:sldSz cx="12192000" cy="6858000"/>
   <p:notesSz cx="6858000" cy="9144000"/>
@@ -214,7 +213,7 @@
           <a:p>
             <a:fld id="{50FABAFA-9D90-4B6C-95A1-503043E46FAB}" type="datetimeFigureOut">
               <a:rPr lang="en-US" smtClean="0"/>
-              <a:t>4/10/22</a:t>
+              <a:t>4/10/2022</a:t>
             </a:fld>
             <a:endParaRPr lang="en-US"/>
           </a:p>
@@ -379,7 +378,7 @@
           <a:p>
             <a:fld id="{AC15EB1F-8DE4-48C3-A804-A05846A4049F}" type="datetimeFigureOut">
               <a:rPr lang="en-US" smtClean="0"/>
-              <a:t>4/10/22</a:t>
+              <a:t>4/10/2022</a:t>
             </a:fld>
             <a:endParaRPr lang="en-US"/>
           </a:p>
@@ -971,7 +970,7 @@
           <a:p>
             <a:fld id="{CE5E0A0C-FFF2-4105-9F07-796FCC3D8DE3}" type="datetime1">
               <a:rPr lang="en-US" smtClean="0"/>
-              <a:t>4/10/22</a:t>
+              <a:t>4/10/2022</a:t>
             </a:fld>
             <a:endParaRPr lang="en-US"/>
           </a:p>
@@ -1197,7 +1196,7 @@
           <a:p>
             <a:fld id="{4A5D68D4-D432-4190-8060-492B59F98A87}" type="datetime1">
               <a:rPr lang="en-US" smtClean="0"/>
-              <a:t>4/10/22</a:t>
+              <a:t>4/10/2022</a:t>
             </a:fld>
             <a:endParaRPr lang="en-US"/>
           </a:p>
@@ -1433,7 +1432,7 @@
           <a:p>
             <a:fld id="{5AF4EF83-7D73-495D-9915-41737B990DFC}" type="datetime1">
               <a:rPr lang="en-US" smtClean="0"/>
-              <a:t>4/10/22</a:t>
+              <a:t>4/10/2022</a:t>
             </a:fld>
             <a:endParaRPr lang="en-US"/>
           </a:p>
@@ -1770,7 +1769,7 @@
           <a:p>
             <a:fld id="{73DF2905-D7E2-4171-961B-8EB802C66F9A}" type="datetime1">
               <a:rPr lang="en-US" smtClean="0"/>
-              <a:t>4/10/22</a:t>
+              <a:t>4/10/2022</a:t>
             </a:fld>
             <a:endParaRPr lang="en-US"/>
           </a:p>
@@ -2033,7 +2032,7 @@
           <a:p>
             <a:fld id="{82C1B47C-16BC-4A9F-9E6E-9D1F33DC8ABD}" type="datetime1">
               <a:rPr lang="en-US" smtClean="0"/>
-              <a:t>4/10/22</a:t>
+              <a:t>4/10/2022</a:t>
             </a:fld>
             <a:endParaRPr lang="en-US"/>
           </a:p>
@@ -2449,7 +2448,7 @@
           <a:p>
             <a:fld id="{0C073DF2-DD31-447B-89F4-CEF82A94D7A7}" type="datetime1">
               <a:rPr lang="en-US" smtClean="0"/>
-              <a:t>4/10/22</a:t>
+              <a:t>4/10/2022</a:t>
             </a:fld>
             <a:endParaRPr lang="en-US"/>
           </a:p>
@@ -2981,7 +2980,7 @@
           <a:p>
             <a:fld id="{1551BB0C-CFA8-4A1F-9AAE-D6B32E8256E7}" type="datetime1">
               <a:rPr lang="en-US" smtClean="0"/>
-              <a:t>4/10/22</a:t>
+              <a:t>4/10/2022</a:t>
             </a:fld>
             <a:endParaRPr lang="en-US"/>
           </a:p>
@@ -3119,7 +3118,7 @@
           <a:p>
             <a:fld id="{2752348D-B72F-4FC3-A127-851C5E7B3A9E}" type="datetime1">
               <a:rPr lang="en-US" smtClean="0"/>
-              <a:t>4/10/22</a:t>
+              <a:t>4/10/2022</a:t>
             </a:fld>
             <a:endParaRPr lang="en-US"/>
           </a:p>
@@ -3229,7 +3228,7 @@
           <a:p>
             <a:fld id="{D666EB1B-704A-4D5E-8D5F-456104532486}" type="datetime1">
               <a:rPr lang="en-US" smtClean="0"/>
-              <a:t>4/10/22</a:t>
+              <a:t>4/10/2022</a:t>
             </a:fld>
             <a:endParaRPr lang="en-US"/>
           </a:p>
@@ -3542,7 +3541,7 @@
           <a:p>
             <a:fld id="{D96AFBEB-CD4D-45C5-9851-D1FF1EB5AB85}" type="datetime1">
               <a:rPr lang="en-US" smtClean="0"/>
-              <a:t>4/10/22</a:t>
+              <a:t>4/10/2022</a:t>
             </a:fld>
             <a:endParaRPr lang="en-US"/>
           </a:p>
@@ -3790,7 +3789,7 @@
           <a:p>
             <a:fld id="{B285B7EB-0ACD-4247-AA3F-1B0B49109B84}" type="datetime1">
               <a:rPr lang="en-US" smtClean="0"/>
-              <a:t>4/10/22</a:t>
+              <a:t>4/10/2022</a:t>
             </a:fld>
             <a:endParaRPr lang="en-US"/>
           </a:p>
@@ -4090,7 +4089,7 @@
             <a:fld id="{8254F2F0-E062-4E41-9176-AEE9734E64AC}" type="datetime1">
               <a:rPr lang="en-US" smtClean="0"/>
               <a:pPr/>
-              <a:t>4/10/22</a:t>
+              <a:t>4/10/2022</a:t>
             </a:fld>
             <a:endParaRPr lang="en-US" dirty="0"/>
           </a:p>
@@ -4622,7 +4621,7 @@
         </p:nvSpPr>
         <p:spPr>
           <a:xfrm>
-            <a:off x="914400" y="1862667"/>
+            <a:off x="914400" y="2368695"/>
             <a:ext cx="10363200" cy="862012"/>
           </a:xfrm>
         </p:spPr>
@@ -4632,7 +4631,7 @@
           <a:p>
             <a:r>
               <a:rPr lang="en-US" sz="5400" dirty="0"/>
-              <a:t>New England Stranding Data Analysis</a:t>
+              <a:t>New England marine mammal and sea turtle Stranding Data Analysis</a:t>
             </a:r>
           </a:p>
         </p:txBody>
@@ -4716,118 +4715,101 @@
           <a:chExt cx="0" cy="0"/>
         </a:xfrm>
       </p:grpSpPr>
-      <p:pic>
-        <p:nvPicPr>
-          <p:cNvPr id="4" name="Picture 3" descr="Chart, bar chart&#10;&#10;Description automatically generated">
+      <p:sp>
+        <p:nvSpPr>
+          <p:cNvPr id="2" name="Title 1">
             <a:extLst>
               <a:ext uri="{FF2B5EF4-FFF2-40B4-BE49-F238E27FC236}">
-                <a16:creationId xmlns:a16="http://schemas.microsoft.com/office/drawing/2014/main" id="{7B29628B-3CEC-0547-A7E7-D5B85650DF29}"/>
+                <a16:creationId xmlns:a16="http://schemas.microsoft.com/office/drawing/2014/main" id="{9F509929-A76B-4B12-852A-BEAB48E2E4E9}"/>
               </a:ext>
             </a:extLst>
           </p:cNvPr>
-          <p:cNvPicPr>
-            <a:picLocks noChangeAspect="1"/>
-          </p:cNvPicPr>
-          <p:nvPr/>
-        </p:nvPicPr>
-        <p:blipFill>
-          <a:blip r:embed="rId2">
-            <a:extLst>
-              <a:ext uri="{28A0092B-C50C-407E-A947-70E740481C1C}">
-                <a14:useLocalDpi xmlns:a14="http://schemas.microsoft.com/office/drawing/2010/main" val="0"/>
-              </a:ext>
-            </a:extLst>
-          </a:blip>
-          <a:stretch>
-            <a:fillRect/>
-          </a:stretch>
-        </p:blipFill>
+          <p:cNvSpPr>
+            <a:spLocks noGrp="1"/>
+          </p:cNvSpPr>
+          <p:nvPr>
+            <p:ph type="title"/>
+          </p:nvPr>
+        </p:nvSpPr>
         <p:spPr>
           <a:xfrm>
-            <a:off x="0" y="3470366"/>
-            <a:ext cx="5486400" cy="3387634"/>
+            <a:off x="466571" y="310148"/>
+            <a:ext cx="5960862" cy="719661"/>
           </a:xfrm>
-          <a:prstGeom prst="rect">
-            <a:avLst/>
-          </a:prstGeom>
         </p:spPr>
-      </p:pic>
-      <p:pic>
-        <p:nvPicPr>
-          <p:cNvPr id="6" name="Picture 5" descr="Chart, bar chart&#10;&#10;Description automatically generated">
+        <p:txBody>
+          <a:bodyPr/>
+          <a:lstStyle/>
+          <a:p>
+            <a:r>
+              <a:rPr lang="en-US" dirty="0"/>
+              <a:t>Geospatial analysis</a:t>
+            </a:r>
+          </a:p>
+        </p:txBody>
+      </p:sp>
+      <p:sp>
+        <p:nvSpPr>
+          <p:cNvPr id="3" name="Content Placeholder 2">
             <a:extLst>
               <a:ext uri="{FF2B5EF4-FFF2-40B4-BE49-F238E27FC236}">
-                <a16:creationId xmlns:a16="http://schemas.microsoft.com/office/drawing/2014/main" id="{E43C17DB-A279-2B45-B0F7-137D4239BF52}"/>
+                <a16:creationId xmlns:a16="http://schemas.microsoft.com/office/drawing/2014/main" id="{2739766A-628B-4F4F-B213-8353786D9EC2}"/>
               </a:ext>
             </a:extLst>
           </p:cNvPr>
-          <p:cNvPicPr>
-            <a:picLocks noChangeAspect="1"/>
-          </p:cNvPicPr>
-          <p:nvPr/>
-        </p:nvPicPr>
-        <p:blipFill>
-          <a:blip r:embed="rId3">
-            <a:extLst>
-              <a:ext uri="{28A0092B-C50C-407E-A947-70E740481C1C}">
-                <a14:useLocalDpi xmlns:a14="http://schemas.microsoft.com/office/drawing/2010/main" val="0"/>
-              </a:ext>
-            </a:extLst>
-          </a:blip>
-          <a:stretch>
-            <a:fillRect/>
-          </a:stretch>
-        </p:blipFill>
+          <p:cNvSpPr>
+            <a:spLocks noGrp="1"/>
+          </p:cNvSpPr>
+          <p:nvPr>
+            <p:ph sz="quarter" idx="13"/>
+          </p:nvPr>
+        </p:nvSpPr>
         <p:spPr>
           <a:xfrm>
-            <a:off x="0" y="0"/>
-            <a:ext cx="5486400" cy="3387634"/>
+            <a:off x="812800" y="1600200"/>
+            <a:ext cx="11180932" cy="4114800"/>
           </a:xfrm>
-          <a:prstGeom prst="rect">
-            <a:avLst/>
-          </a:prstGeom>
         </p:spPr>
-      </p:pic>
-      <p:pic>
-        <p:nvPicPr>
-          <p:cNvPr id="3" name="Picture 2" descr="Chart, bar chart&#10;&#10;Description automatically generated">
-            <a:extLst>
-              <a:ext uri="{FF2B5EF4-FFF2-40B4-BE49-F238E27FC236}">
-                <a16:creationId xmlns:a16="http://schemas.microsoft.com/office/drawing/2014/main" id="{076D4E72-8EF5-3347-996C-A9C8BFECEC63}"/>
-              </a:ext>
-            </a:extLst>
-          </p:cNvPr>
-          <p:cNvPicPr>
-            <a:picLocks noChangeAspect="1"/>
-          </p:cNvPicPr>
-          <p:nvPr/>
-        </p:nvPicPr>
-        <p:blipFill>
-          <a:blip r:embed="rId3">
-            <a:extLst>
-              <a:ext uri="{28A0092B-C50C-407E-A947-70E740481C1C}">
-                <a14:useLocalDpi xmlns:a14="http://schemas.microsoft.com/office/drawing/2010/main" val="0"/>
-              </a:ext>
-            </a:extLst>
-          </a:blip>
-          <a:stretch>
-            <a:fillRect/>
-          </a:stretch>
-        </p:blipFill>
-        <p:spPr>
-          <a:xfrm>
-            <a:off x="5578896" y="1513490"/>
-            <a:ext cx="6592084" cy="4070350"/>
-          </a:xfrm>
-          <a:prstGeom prst="rect">
-            <a:avLst/>
-          </a:prstGeom>
-        </p:spPr>
-      </p:pic>
+        <p:txBody>
+          <a:bodyPr/>
+          <a:lstStyle/>
+          <a:p>
+            <a:r>
+              <a:rPr lang="en-US" dirty="0"/>
+              <a:t>Pinnipeds</a:t>
+            </a:r>
+          </a:p>
+          <a:p>
+            <a:r>
+              <a:rPr lang="en-US" dirty="0"/>
+              <a:t>Sea Turtles</a:t>
+            </a:r>
+          </a:p>
+          <a:p>
+            <a:pPr lvl="1"/>
+            <a:r>
+              <a:rPr lang="en-US" dirty="0"/>
+              <a:t>Of the 256 total strandings, 205 of them were within 40,000m of mean latitude and longitude </a:t>
+            </a:r>
+          </a:p>
+          <a:p>
+            <a:r>
+              <a:rPr lang="en-US" dirty="0"/>
+              <a:t>Odontocetes</a:t>
+            </a:r>
+          </a:p>
+          <a:p>
+            <a:r>
+              <a:rPr lang="en-US" dirty="0"/>
+              <a:t>Mysticetes</a:t>
+            </a:r>
+          </a:p>
+        </p:txBody>
+      </p:sp>
     </p:spTree>
     <p:extLst>
       <p:ext uri="{BB962C8B-B14F-4D97-AF65-F5344CB8AC3E}">
-        <p14:creationId xmlns:p14="http://schemas.microsoft.com/office/powerpoint/2010/main" val="250487806"/>
+        <p14:creationId xmlns:p14="http://schemas.microsoft.com/office/powerpoint/2010/main" val="731257611"/>
       </p:ext>
     </p:extLst>
   </p:cSld>
@@ -4871,167 +4853,6 @@
           <p:cNvPr id="2" name="Title 1">
             <a:extLst>
               <a:ext uri="{FF2B5EF4-FFF2-40B4-BE49-F238E27FC236}">
-                <a16:creationId xmlns:a16="http://schemas.microsoft.com/office/drawing/2014/main" id="{D83CCB03-7C47-4A63-BE31-3DA6401531CF}"/>
-              </a:ext>
-            </a:extLst>
-          </p:cNvPr>
-          <p:cNvSpPr>
-            <a:spLocks noGrp="1"/>
-          </p:cNvSpPr>
-          <p:nvPr>
-            <p:ph type="title"/>
-          </p:nvPr>
-        </p:nvSpPr>
-        <p:spPr>
-          <a:xfrm>
-            <a:off x="812800" y="274638"/>
-            <a:ext cx="10566400" cy="631295"/>
-          </a:xfrm>
-        </p:spPr>
-        <p:txBody>
-          <a:bodyPr/>
-          <a:lstStyle/>
-          <a:p>
-            <a:r>
-              <a:rPr lang="en-US" sz="4400" dirty="0"/>
-              <a:t>Results</a:t>
-            </a:r>
-          </a:p>
-        </p:txBody>
-      </p:sp>
-      <p:sp>
-        <p:nvSpPr>
-          <p:cNvPr id="3" name="Content Placeholder 2">
-            <a:extLst>
-              <a:ext uri="{FF2B5EF4-FFF2-40B4-BE49-F238E27FC236}">
-                <a16:creationId xmlns:a16="http://schemas.microsoft.com/office/drawing/2014/main" id="{6F5F2A8C-FDEF-40B5-99BF-0FE69415E41F}"/>
-              </a:ext>
-            </a:extLst>
-          </p:cNvPr>
-          <p:cNvSpPr>
-            <a:spLocks noGrp="1"/>
-          </p:cNvSpPr>
-          <p:nvPr>
-            <p:ph sz="quarter" idx="13"/>
-          </p:nvPr>
-        </p:nvSpPr>
-        <p:spPr>
-          <a:xfrm>
-            <a:off x="812799" y="905933"/>
-            <a:ext cx="10566399" cy="4809067"/>
-          </a:xfrm>
-        </p:spPr>
-        <p:txBody>
-          <a:bodyPr/>
-          <a:lstStyle/>
-          <a:p>
-            <a:r>
-              <a:rPr lang="en-US" sz="2400" dirty="0"/>
-              <a:t>Pinnipeds</a:t>
-            </a:r>
-          </a:p>
-          <a:p>
-            <a:pPr lvl="1"/>
-            <a:r>
-              <a:rPr lang="en-US" sz="2400" dirty="0"/>
-              <a:t>Years and months are statistically significant for number of strandings</a:t>
-            </a:r>
-          </a:p>
-          <a:p>
-            <a:pPr lvl="1"/>
-            <a:r>
-              <a:rPr lang="en-US" sz="2400" dirty="0"/>
-              <a:t>“Mean” stranding area (and distances from) determined</a:t>
-            </a:r>
-          </a:p>
-          <a:p>
-            <a:pPr lvl="1"/>
-            <a:r>
-              <a:rPr lang="en-US" sz="2400" dirty="0"/>
-              <a:t>Yearly increasing trend in strandings</a:t>
-            </a:r>
-          </a:p>
-          <a:p>
-            <a:pPr lvl="1"/>
-            <a:r>
-              <a:rPr lang="en-US" sz="2400" dirty="0"/>
-              <a:t>Possible seasonality – pupping season?</a:t>
-            </a:r>
-          </a:p>
-          <a:p>
-            <a:pPr lvl="1"/>
-            <a:endParaRPr lang="en-US" sz="2400" dirty="0"/>
-          </a:p>
-          <a:p>
-            <a:r>
-              <a:rPr lang="en-US" sz="2400" dirty="0"/>
-              <a:t>Turtles</a:t>
-            </a:r>
-          </a:p>
-          <a:p>
-            <a:r>
-              <a:rPr lang="en-US" sz="2400" dirty="0"/>
-              <a:t>Mysticetes</a:t>
-            </a:r>
-          </a:p>
-          <a:p>
-            <a:r>
-              <a:rPr lang="en-US" sz="2400" dirty="0"/>
-              <a:t>Odontocetes</a:t>
-            </a:r>
-          </a:p>
-          <a:p>
-            <a:endParaRPr lang="en-US" dirty="0"/>
-          </a:p>
-        </p:txBody>
-      </p:sp>
-    </p:spTree>
-    <p:extLst>
-      <p:ext uri="{BB962C8B-B14F-4D97-AF65-F5344CB8AC3E}">
-        <p14:creationId xmlns:p14="http://schemas.microsoft.com/office/powerpoint/2010/main" val="147404976"/>
-      </p:ext>
-    </p:extLst>
-  </p:cSld>
-  <p:clrMapOvr>
-    <a:masterClrMapping/>
-  </p:clrMapOvr>
-  <mc:AlternateContent xmlns:mc="http://schemas.openxmlformats.org/markup-compatibility/2006" xmlns:p14="http://schemas.microsoft.com/office/powerpoint/2010/main">
-    <mc:Choice Requires="p14">
-      <p:transition spd="med" p14:dur="700">
-        <p:fade/>
-      </p:transition>
-    </mc:Choice>
-    <mc:Fallback xmlns="">
-      <p:transition spd="med">
-        <p:fade/>
-      </p:transition>
-    </mc:Fallback>
-  </mc:AlternateContent>
-</p:sld>
-</file>
-
-<file path=ppt/slides/slide12.xml><?xml version="1.0" encoding="utf-8"?>
-<p:sld xmlns:a="http://schemas.openxmlformats.org/drawingml/2006/main" xmlns:r="http://schemas.openxmlformats.org/officeDocument/2006/relationships" xmlns:p="http://schemas.openxmlformats.org/presentationml/2006/main">
-  <p:cSld>
-    <p:spTree>
-      <p:nvGrpSpPr>
-        <p:cNvPr id="1" name=""/>
-        <p:cNvGrpSpPr/>
-        <p:nvPr/>
-      </p:nvGrpSpPr>
-      <p:grpSpPr>
-        <a:xfrm>
-          <a:off x="0" y="0"/>
-          <a:ext cx="0" cy="0"/>
-          <a:chOff x="0" y="0"/>
-          <a:chExt cx="0" cy="0"/>
-        </a:xfrm>
-      </p:grpSpPr>
-      <p:sp>
-        <p:nvSpPr>
-          <p:cNvPr id="2" name="Title 1">
-            <a:extLst>
-              <a:ext uri="{FF2B5EF4-FFF2-40B4-BE49-F238E27FC236}">
                 <a16:creationId xmlns:a16="http://schemas.microsoft.com/office/drawing/2014/main" id="{77490A1F-0091-4EE1-B4DF-CBDCCBBC9650}"/>
               </a:ext>
             </a:extLst>
@@ -5083,29 +4904,127 @@
           </a:xfrm>
         </p:spPr>
         <p:txBody>
-          <a:bodyPr/>
+          <a:bodyPr>
+            <a:normAutofit fontScale="77500" lnSpcReduction="20000"/>
+          </a:bodyPr>
           <a:lstStyle/>
           <a:p>
             <a:r>
               <a:rPr lang="en-US" sz="2400" dirty="0"/>
-              <a:t>Knowing that years and months are statically different for strandings opens to door for future analyses as to why these differences exist.</a:t>
-            </a:r>
-          </a:p>
-          <a:p>
-            <a:pPr lvl="1"/>
+              <a:t>Pinnipeds</a:t>
+            </a:r>
+          </a:p>
+          <a:p>
+            <a:pPr lvl="2"/>
+            <a:r>
+              <a:rPr lang="en-US" sz="1800" dirty="0"/>
+              <a:t>Years and months are statistically significant for number of strandings</a:t>
+            </a:r>
+          </a:p>
+          <a:p>
+            <a:pPr lvl="2"/>
+            <a:r>
+              <a:rPr lang="en-US" sz="1800" dirty="0"/>
+              <a:t>“Mean” stranding area (and distances from) determined</a:t>
+            </a:r>
+          </a:p>
+          <a:p>
+            <a:pPr lvl="2"/>
+            <a:r>
+              <a:rPr lang="en-US" sz="1800" dirty="0"/>
+              <a:t>Yearly increasing trend in strandings</a:t>
+            </a:r>
+          </a:p>
+          <a:p>
+            <a:pPr lvl="2"/>
+            <a:r>
+              <a:rPr lang="en-US" sz="1800" dirty="0"/>
+              <a:t>Possible seasonality – pupping season?</a:t>
+            </a:r>
+          </a:p>
+          <a:p>
             <a:r>
               <a:rPr lang="en-US" sz="2400" dirty="0"/>
-              <a:t>Knowing why can allow for prediction and/or prevention</a:t>
+              <a:t>Sea turtles</a:t>
+            </a:r>
+          </a:p>
+          <a:p>
+            <a:pPr lvl="2"/>
+            <a:r>
+              <a:rPr lang="en-US" sz="1900" dirty="0"/>
+              <a:t>Concentrated to summer months (corresponds with nesting season)</a:t>
+            </a:r>
+          </a:p>
+          <a:p>
+            <a:pPr lvl="2"/>
+            <a:r>
+              <a:rPr lang="en-US" sz="1900" dirty="0"/>
+              <a:t>Majority occur within 40,000m of each other – potential hotspot?</a:t>
             </a:r>
           </a:p>
           <a:p>
             <a:r>
               <a:rPr lang="en-US" sz="2400" dirty="0"/>
-              <a:t>Knowing time trends and geospatial locations allows for better allocation of resources for stranding response</a:t>
-            </a:r>
-            <a:r>
-              <a:rPr lang="en-US" dirty="0"/>
-              <a:t>.</a:t>
+              <a:t>Odontocetes</a:t>
+            </a:r>
+          </a:p>
+          <a:p>
+            <a:r>
+              <a:rPr lang="en-US" sz="2400" dirty="0"/>
+              <a:t>Mysticetes</a:t>
+            </a:r>
+          </a:p>
+          <a:p>
+            <a:r>
+              <a:rPr lang="en-US" sz="2400" dirty="0"/>
+              <a:t>Understanding how strandings change annually and monthly is necessary for stranding prevention and response, resource allocation, and conservation management</a:t>
+            </a:r>
+          </a:p>
+          <a:p>
+            <a:r>
+              <a:rPr lang="en-US" sz="2400" dirty="0"/>
+              <a:t>To improve this analysis, would be beneficial to have additional data on cause of death</a:t>
+            </a:r>
+          </a:p>
+        </p:txBody>
+      </p:sp>
+      <p:sp>
+        <p:nvSpPr>
+          <p:cNvPr id="5" name="TextBox 4">
+            <a:extLst>
+              <a:ext uri="{FF2B5EF4-FFF2-40B4-BE49-F238E27FC236}">
+                <a16:creationId xmlns:a16="http://schemas.microsoft.com/office/drawing/2014/main" id="{C04DB75D-FD57-46BB-B36A-3A50CB87819D}"/>
+              </a:ext>
+            </a:extLst>
+          </p:cNvPr>
+          <p:cNvSpPr txBox="1"/>
+          <p:nvPr/>
+        </p:nvSpPr>
+        <p:spPr>
+          <a:xfrm>
+            <a:off x="8249576" y="6312670"/>
+            <a:ext cx="3726401" cy="369332"/>
+          </a:xfrm>
+          <a:prstGeom prst="rect">
+            <a:avLst/>
+          </a:prstGeom>
+          <a:noFill/>
+          <a:ln>
+            <a:noFill/>
+          </a:ln>
+        </p:spPr>
+        <p:txBody>
+          <a:bodyPr wrap="square">
+            <a:spAutoFit/>
+          </a:bodyPr>
+          <a:lstStyle/>
+          <a:p>
+            <a:pPr marL="0" indent="0">
+              <a:buNone/>
+            </a:pPr>
+            <a:r>
+              <a:rPr lang="en-US" sz="1800" i="1" dirty="0"/>
+              <a:t>***Time series results are TBD***</a:t>
             </a:r>
           </a:p>
         </p:txBody>
@@ -5191,54 +5110,66 @@
         </p:nvSpPr>
         <p:spPr>
           <a:xfrm>
-            <a:off x="668867" y="973667"/>
-            <a:ext cx="10710333" cy="5494866"/>
+            <a:off x="106532" y="1328774"/>
+            <a:ext cx="4918229" cy="5045393"/>
           </a:xfrm>
         </p:spPr>
         <p:txBody>
           <a:bodyPr>
-            <a:normAutofit/>
+            <a:normAutofit fontScale="92500" lnSpcReduction="20000"/>
           </a:bodyPr>
           <a:lstStyle/>
           <a:p>
             <a:r>
-              <a:rPr lang="en-US" sz="4000" dirty="0"/>
-              <a:t>Collected by Mystic Aquarium</a:t>
-            </a:r>
-          </a:p>
-          <a:p>
-            <a:r>
-              <a:rPr lang="en-US" sz="4000" dirty="0"/>
-              <a:t>Curated &amp; managed by OBIS-SEA</a:t>
-            </a:r>
-          </a:p>
-          <a:p>
-            <a:r>
-              <a:rPr lang="en-US" sz="4000" dirty="0"/>
-              <a:t>Cetaceans, pinnipeds, &amp; turtles in NE</a:t>
-            </a:r>
-          </a:p>
-          <a:p>
-            <a:pPr lvl="1"/>
-            <a:r>
-              <a:rPr lang="en-US" sz="4000" dirty="0"/>
-              <a:t>Cetaceans divided into Mysticetes and Odontocetes</a:t>
-            </a:r>
-          </a:p>
-          <a:p>
-            <a:r>
-              <a:rPr lang="en-US" sz="4000" dirty="0"/>
-              <a:t>1990-2011</a:t>
-            </a:r>
-          </a:p>
-          <a:p>
-            <a:endParaRPr lang="en-US" sz="4000" dirty="0"/>
-          </a:p>
-          <a:p>
-            <a:pPr marL="457200" lvl="1" indent="0">
-              <a:buNone/>
-            </a:pPr>
-            <a:endParaRPr lang="en-US" sz="4000" dirty="0"/>
+              <a:rPr lang="en-US" sz="2800" dirty="0"/>
+              <a:t>Stranding data collected by Mystic Aquarium from 1990 – 2011</a:t>
+            </a:r>
+          </a:p>
+          <a:p>
+            <a:r>
+              <a:rPr lang="en-US" sz="2800" dirty="0"/>
+              <a:t>Spatial range: Connecticut and Rhode Island</a:t>
+            </a:r>
+          </a:p>
+          <a:p>
+            <a:r>
+              <a:rPr lang="en-US" sz="2800" dirty="0"/>
+              <a:t>Curated &amp; managed by OBIS-SEAMAP</a:t>
+            </a:r>
+          </a:p>
+          <a:p>
+            <a:r>
+              <a:rPr lang="en-US" sz="2800" dirty="0"/>
+              <a:t>1,140 cetacean, pinniped, and sea turtle strandings</a:t>
+            </a:r>
+          </a:p>
+          <a:p>
+            <a:pPr lvl="2"/>
+            <a:r>
+              <a:rPr lang="en-US" sz="2100" dirty="0"/>
+              <a:t>679 Pinnipeds</a:t>
+            </a:r>
+          </a:p>
+          <a:p>
+            <a:pPr lvl="2"/>
+            <a:r>
+              <a:rPr lang="en-US" sz="2100" dirty="0"/>
+              <a:t>256 Turtles</a:t>
+            </a:r>
+          </a:p>
+          <a:p>
+            <a:pPr lvl="2"/>
+            <a:r>
+              <a:rPr lang="en-US" sz="2100" dirty="0"/>
+              <a:t>155 Odontocetes</a:t>
+            </a:r>
+          </a:p>
+          <a:p>
+            <a:pPr lvl="2"/>
+            <a:r>
+              <a:rPr lang="en-US" sz="2100" dirty="0"/>
+              <a:t>50 Mysticetes </a:t>
+            </a:r>
           </a:p>
           <a:p>
             <a:endParaRPr lang="en-US" sz="3200" dirty="0"/>
@@ -5248,6 +5179,36 @@
           </a:p>
         </p:txBody>
       </p:sp>
+      <p:pic>
+        <p:nvPicPr>
+          <p:cNvPr id="3" name="Picture 2">
+            <a:extLst>
+              <a:ext uri="{FF2B5EF4-FFF2-40B4-BE49-F238E27FC236}">
+                <a16:creationId xmlns:a16="http://schemas.microsoft.com/office/drawing/2014/main" id="{D0152D16-E251-43A2-896B-34605E4BE809}"/>
+              </a:ext>
+            </a:extLst>
+          </p:cNvPr>
+          <p:cNvPicPr>
+            <a:picLocks noChangeAspect="1"/>
+          </p:cNvPicPr>
+          <p:nvPr/>
+        </p:nvPicPr>
+        <p:blipFill>
+          <a:blip r:embed="rId2"/>
+          <a:stretch>
+            <a:fillRect/>
+          </a:stretch>
+        </p:blipFill>
+        <p:spPr>
+          <a:xfrm>
+            <a:off x="4914663" y="1417551"/>
+            <a:ext cx="7077815" cy="4548243"/>
+          </a:xfrm>
+          <a:prstGeom prst="rect">
+            <a:avLst/>
+          </a:prstGeom>
+        </p:spPr>
+      </p:pic>
     </p:spTree>
     <p:extLst>
       <p:ext uri="{BB962C8B-B14F-4D97-AF65-F5344CB8AC3E}">
@@ -5318,7 +5279,7 @@
           <a:p>
             <a:r>
               <a:rPr lang="en-US" sz="4400" dirty="0"/>
-              <a:t>Question(s)</a:t>
+              <a:t>Questions</a:t>
             </a:r>
           </a:p>
         </p:txBody>
@@ -5341,8 +5302,8 @@
         </p:nvSpPr>
         <p:spPr>
           <a:xfrm>
-            <a:off x="812800" y="982133"/>
-            <a:ext cx="10566400" cy="5601229"/>
+            <a:off x="329953" y="1754491"/>
+            <a:ext cx="11532094" cy="2533424"/>
           </a:xfrm>
         </p:spPr>
         <p:txBody>
@@ -5351,22 +5312,40 @@
           </a:bodyPr>
           <a:lstStyle/>
           <a:p>
-            <a:r>
-              <a:rPr lang="en-US" sz="4000" dirty="0"/>
+            <a:pPr marL="742950" indent="-742950">
+              <a:buFont typeface="+mj-lt"/>
+              <a:buAutoNum type="arabicPeriod"/>
+            </a:pPr>
+            <a:r>
+              <a:rPr lang="en-US" sz="3000" dirty="0"/>
               <a:t>Are there any significant differences between years and/or months for strandings for each family group?</a:t>
             </a:r>
           </a:p>
           <a:p>
-            <a:r>
-              <a:rPr lang="en-US" sz="4000" dirty="0"/>
+            <a:pPr marL="742950" indent="-742950">
+              <a:buFont typeface="+mj-lt"/>
+              <a:buAutoNum type="arabicPeriod"/>
+            </a:pPr>
+            <a:r>
+              <a:rPr lang="en-US" sz="3000" dirty="0"/>
+              <a:t>How are the strandings related geospatially? Are there potential stranding hotspots?</a:t>
+            </a:r>
+          </a:p>
+          <a:p>
+            <a:pPr marL="742950" indent="-742950">
+              <a:buFont typeface="+mj-lt"/>
+              <a:buAutoNum type="arabicPeriod"/>
+            </a:pPr>
+            <a:r>
+              <a:rPr lang="en-US" sz="3000" dirty="0"/>
               <a:t>Are there any temporal trends/patterns?</a:t>
             </a:r>
           </a:p>
           <a:p>
-            <a:r>
-              <a:rPr lang="en-US" sz="4000" dirty="0"/>
-              <a:t>How are the strandings related geospatially?</a:t>
-            </a:r>
+            <a:pPr marL="0" indent="0">
+              <a:buNone/>
+            </a:pPr>
+            <a:endParaRPr lang="en-US" sz="4000" dirty="0"/>
           </a:p>
         </p:txBody>
       </p:sp>
@@ -5463,8 +5442,8 @@
         </p:nvSpPr>
         <p:spPr>
           <a:xfrm>
-            <a:off x="541867" y="1100666"/>
-            <a:ext cx="5249334" cy="5757333"/>
+            <a:off x="244016" y="1100666"/>
+            <a:ext cx="5547185" cy="5757333"/>
           </a:xfrm>
         </p:spPr>
         <p:txBody>
@@ -5494,14 +5473,14 @@
             <a:pPr lvl="1"/>
             <a:r>
               <a:rPr lang="en-US" sz="2400" dirty="0"/>
-              <a:t>Mysticetes</a:t>
+              <a:t>Mysticetes (baleen whales)</a:t>
             </a:r>
           </a:p>
           <a:p>
             <a:pPr lvl="1"/>
             <a:r>
               <a:rPr lang="en-US" sz="2400" dirty="0"/>
-              <a:t>Odontocetes</a:t>
+              <a:t>Odontocetes (toothed whales)</a:t>
             </a:r>
           </a:p>
           <a:p>
@@ -5629,7 +5608,7 @@
         </p:blipFill>
         <p:spPr>
           <a:xfrm>
-            <a:off x="0" y="1181369"/>
+            <a:off x="0" y="1793929"/>
             <a:ext cx="5799667" cy="4250488"/>
           </a:xfrm>
           <a:prstGeom prst="rect">
@@ -5665,7 +5644,7 @@
         </p:blipFill>
         <p:spPr>
           <a:xfrm>
-            <a:off x="5799666" y="1181369"/>
+            <a:off x="5799667" y="1793929"/>
             <a:ext cx="6392333" cy="4250488"/>
           </a:xfrm>
           <a:prstGeom prst="rect">
@@ -5673,6 +5652,39 @@
           </a:prstGeom>
         </p:spPr>
       </p:pic>
+      <p:sp>
+        <p:nvSpPr>
+          <p:cNvPr id="4" name="Title 1">
+            <a:extLst>
+              <a:ext uri="{FF2B5EF4-FFF2-40B4-BE49-F238E27FC236}">
+                <a16:creationId xmlns:a16="http://schemas.microsoft.com/office/drawing/2014/main" id="{1EC9EF30-347A-4681-82D7-369ED455AC89}"/>
+              </a:ext>
+            </a:extLst>
+          </p:cNvPr>
+          <p:cNvSpPr>
+            <a:spLocks noGrp="1"/>
+          </p:cNvSpPr>
+          <p:nvPr>
+            <p:ph type="title"/>
+          </p:nvPr>
+        </p:nvSpPr>
+        <p:spPr>
+          <a:xfrm>
+            <a:off x="541867" y="274637"/>
+            <a:ext cx="10837333" cy="673629"/>
+          </a:xfrm>
+        </p:spPr>
+        <p:txBody>
+          <a:bodyPr/>
+          <a:lstStyle/>
+          <a:p>
+            <a:r>
+              <a:rPr lang="en-US" sz="4400" dirty="0"/>
+              <a:t>Strandings summary</a:t>
+            </a:r>
+          </a:p>
+        </p:txBody>
+      </p:sp>
     </p:spTree>
     <p:extLst>
       <p:ext uri="{BB962C8B-B14F-4D97-AF65-F5344CB8AC3E}">
@@ -5743,20 +5755,53 @@
         </p:blipFill>
         <p:spPr>
           <a:xfrm>
-            <a:off x="0" y="-90658"/>
-            <a:ext cx="5630333" cy="3473258"/>
+            <a:off x="-1" y="1489567"/>
+            <a:ext cx="6924583" cy="4271660"/>
           </a:xfrm>
           <a:prstGeom prst="rect">
             <a:avLst/>
           </a:prstGeom>
         </p:spPr>
       </p:pic>
+      <p:sp>
+        <p:nvSpPr>
+          <p:cNvPr id="7" name="Title 1">
+            <a:extLst>
+              <a:ext uri="{FF2B5EF4-FFF2-40B4-BE49-F238E27FC236}">
+                <a16:creationId xmlns:a16="http://schemas.microsoft.com/office/drawing/2014/main" id="{B06DDC07-7E3C-4518-96F4-27B8D791C30E}"/>
+              </a:ext>
+            </a:extLst>
+          </p:cNvPr>
+          <p:cNvSpPr>
+            <a:spLocks noGrp="1"/>
+          </p:cNvSpPr>
+          <p:nvPr>
+            <p:ph type="title"/>
+          </p:nvPr>
+        </p:nvSpPr>
+        <p:spPr>
+          <a:xfrm>
+            <a:off x="417580" y="479387"/>
+            <a:ext cx="3754925" cy="426699"/>
+          </a:xfrm>
+        </p:spPr>
+        <p:txBody>
+          <a:bodyPr/>
+          <a:lstStyle/>
+          <a:p>
+            <a:r>
+              <a:rPr lang="en-US" sz="4400" dirty="0"/>
+              <a:t>Pinnipeds</a:t>
+            </a:r>
+          </a:p>
+        </p:txBody>
+      </p:sp>
       <p:pic>
         <p:nvPicPr>
-          <p:cNvPr id="3" name="Picture 2">
+          <p:cNvPr id="6" name="Picture 5">
             <a:extLst>
               <a:ext uri="{FF2B5EF4-FFF2-40B4-BE49-F238E27FC236}">
-                <a16:creationId xmlns:a16="http://schemas.microsoft.com/office/drawing/2014/main" id="{813D5A2E-F26E-47BD-94A9-BD67C3B75EEB}"/>
+                <a16:creationId xmlns:a16="http://schemas.microsoft.com/office/drawing/2014/main" id="{3218E2B8-BB24-4CA0-AA7C-EBA035780BBE}"/>
               </a:ext>
             </a:extLst>
           </p:cNvPr>
@@ -5766,57 +5811,15 @@
           <p:nvPr/>
         </p:nvPicPr>
         <p:blipFill>
-          <a:blip r:embed="rId3">
-            <a:extLst>
-              <a:ext uri="{28A0092B-C50C-407E-A947-70E740481C1C}">
-                <a14:useLocalDpi xmlns:a14="http://schemas.microsoft.com/office/drawing/2010/main" val="0"/>
-              </a:ext>
-            </a:extLst>
-          </a:blip>
+          <a:blip r:embed="rId3"/>
           <a:stretch>
             <a:fillRect/>
           </a:stretch>
         </p:blipFill>
         <p:spPr>
           <a:xfrm>
-            <a:off x="5630332" y="1405109"/>
-            <a:ext cx="6561667" cy="4047781"/>
-          </a:xfrm>
-          <a:prstGeom prst="rect">
-            <a:avLst/>
-          </a:prstGeom>
-        </p:spPr>
-      </p:pic>
-      <p:pic>
-        <p:nvPicPr>
-          <p:cNvPr id="5" name="Picture 4">
-            <a:extLst>
-              <a:ext uri="{FF2B5EF4-FFF2-40B4-BE49-F238E27FC236}">
-                <a16:creationId xmlns:a16="http://schemas.microsoft.com/office/drawing/2014/main" id="{F77ADB5A-B9F7-49E5-A5F5-6B773DC7B740}"/>
-              </a:ext>
-            </a:extLst>
-          </p:cNvPr>
-          <p:cNvPicPr>
-            <a:picLocks noChangeAspect="1"/>
-          </p:cNvPicPr>
-          <p:nvPr/>
-        </p:nvPicPr>
-        <p:blipFill>
-          <a:blip r:embed="rId4">
-            <a:extLst>
-              <a:ext uri="{28A0092B-C50C-407E-A947-70E740481C1C}">
-                <a14:useLocalDpi xmlns:a14="http://schemas.microsoft.com/office/drawing/2010/main" val="0"/>
-              </a:ext>
-            </a:extLst>
-          </a:blip>
-          <a:stretch>
-            <a:fillRect/>
-          </a:stretch>
-        </p:blipFill>
-        <p:spPr>
-          <a:xfrm>
-            <a:off x="-1" y="3382600"/>
-            <a:ext cx="5630333" cy="3475401"/>
+            <a:off x="5267416" y="1489567"/>
+            <a:ext cx="6924584" cy="4271660"/>
           </a:xfrm>
           <a:prstGeom prst="rect">
             <a:avLst/>
@@ -5893,14 +5896,119 @@
         </p:blipFill>
         <p:spPr>
           <a:xfrm>
-            <a:off x="990600" y="279565"/>
-            <a:ext cx="10210800" cy="6298870"/>
+            <a:off x="1" y="1882068"/>
+            <a:ext cx="7362548" cy="4541831"/>
           </a:xfrm>
           <a:prstGeom prst="rect">
             <a:avLst/>
           </a:prstGeom>
         </p:spPr>
       </p:pic>
+      <p:pic>
+        <p:nvPicPr>
+          <p:cNvPr id="4" name="Picture 3">
+            <a:extLst>
+              <a:ext uri="{FF2B5EF4-FFF2-40B4-BE49-F238E27FC236}">
+                <a16:creationId xmlns:a16="http://schemas.microsoft.com/office/drawing/2014/main" id="{F5E54379-284C-4BD5-A847-8A356983312A}"/>
+              </a:ext>
+            </a:extLst>
+          </p:cNvPr>
+          <p:cNvPicPr>
+            <a:picLocks noChangeAspect="1"/>
+          </p:cNvPicPr>
+          <p:nvPr/>
+        </p:nvPicPr>
+        <p:blipFill>
+          <a:blip r:embed="rId3">
+            <a:extLst>
+              <a:ext uri="{28A0092B-C50C-407E-A947-70E740481C1C}">
+                <a14:useLocalDpi xmlns:a14="http://schemas.microsoft.com/office/drawing/2010/main" val="0"/>
+              </a:ext>
+            </a:extLst>
+          </a:blip>
+          <a:stretch>
+            <a:fillRect/>
+          </a:stretch>
+        </p:blipFill>
+        <p:spPr>
+          <a:xfrm>
+            <a:off x="4829452" y="1882067"/>
+            <a:ext cx="7362548" cy="4541831"/>
+          </a:xfrm>
+          <a:prstGeom prst="rect">
+            <a:avLst/>
+          </a:prstGeom>
+        </p:spPr>
+      </p:pic>
+      <p:sp>
+        <p:nvSpPr>
+          <p:cNvPr id="5" name="Title 1">
+            <a:extLst>
+              <a:ext uri="{FF2B5EF4-FFF2-40B4-BE49-F238E27FC236}">
+                <a16:creationId xmlns:a16="http://schemas.microsoft.com/office/drawing/2014/main" id="{E51B0ED9-D4DF-4586-BCC5-0EEDC72C4CF7}"/>
+              </a:ext>
+            </a:extLst>
+          </p:cNvPr>
+          <p:cNvSpPr>
+            <a:spLocks noGrp="1"/>
+          </p:cNvSpPr>
+          <p:nvPr>
+            <p:ph type="title"/>
+          </p:nvPr>
+        </p:nvSpPr>
+        <p:spPr/>
+        <p:txBody>
+          <a:bodyPr/>
+          <a:lstStyle/>
+          <a:p>
+            <a:r>
+              <a:rPr lang="en-US" sz="4400" dirty="0"/>
+              <a:t>Sea turtles:</a:t>
+            </a:r>
+          </a:p>
+        </p:txBody>
+      </p:sp>
+      <p:sp>
+        <p:nvSpPr>
+          <p:cNvPr id="6" name="Content Placeholder 5">
+            <a:extLst>
+              <a:ext uri="{FF2B5EF4-FFF2-40B4-BE49-F238E27FC236}">
+                <a16:creationId xmlns:a16="http://schemas.microsoft.com/office/drawing/2014/main" id="{E770E934-3EFD-4249-9181-C291241550E1}"/>
+              </a:ext>
+            </a:extLst>
+          </p:cNvPr>
+          <p:cNvSpPr>
+            <a:spLocks noGrp="1"/>
+          </p:cNvSpPr>
+          <p:nvPr>
+            <p:ph sz="quarter" idx="13"/>
+          </p:nvPr>
+        </p:nvSpPr>
+        <p:spPr>
+          <a:xfrm>
+            <a:off x="5651129" y="434102"/>
+            <a:ext cx="6422501" cy="1143000"/>
+          </a:xfrm>
+        </p:spPr>
+        <p:txBody>
+          <a:bodyPr>
+            <a:normAutofit/>
+          </a:bodyPr>
+          <a:lstStyle/>
+          <a:p>
+            <a:r>
+              <a:rPr lang="en-US" dirty="0"/>
+              <a:t>1995: most statistically different (p-value &lt; 0.05)</a:t>
+            </a:r>
+          </a:p>
+          <a:p>
+            <a:r>
+              <a:rPr lang="en-US" dirty="0"/>
+              <a:t>July – September: most statistically different (p-values &lt; 0.05)</a:t>
+            </a:r>
+          </a:p>
+        </p:txBody>
+      </p:sp>
     </p:spTree>
     <p:extLst>
       <p:ext uri="{BB962C8B-B14F-4D97-AF65-F5344CB8AC3E}">
@@ -5948,7 +6056,7 @@
           <p:cNvPr id="3" name="Picture 2">
             <a:extLst>
               <a:ext uri="{FF2B5EF4-FFF2-40B4-BE49-F238E27FC236}">
-                <a16:creationId xmlns:a16="http://schemas.microsoft.com/office/drawing/2014/main" id="{9FCC8AA4-F7C7-4491-99FF-B360671B485A}"/>
+                <a16:creationId xmlns:a16="http://schemas.microsoft.com/office/drawing/2014/main" id="{E091C062-444C-4039-8653-6619EB49AA34}"/>
               </a:ext>
             </a:extLst>
           </p:cNvPr>
@@ -5971,18 +6079,87 @@
         </p:blipFill>
         <p:spPr>
           <a:xfrm>
-            <a:off x="760085" y="137364"/>
-            <a:ext cx="10671830" cy="6583272"/>
+            <a:off x="0" y="1420426"/>
+            <a:ext cx="7229383" cy="4459683"/>
           </a:xfrm>
           <a:prstGeom prst="rect">
             <a:avLst/>
           </a:prstGeom>
         </p:spPr>
       </p:pic>
+      <p:pic>
+        <p:nvPicPr>
+          <p:cNvPr id="4" name="Picture 3">
+            <a:extLst>
+              <a:ext uri="{FF2B5EF4-FFF2-40B4-BE49-F238E27FC236}">
+                <a16:creationId xmlns:a16="http://schemas.microsoft.com/office/drawing/2014/main" id="{37DE8069-4E43-DD42-BC25-53778FA10E10}"/>
+              </a:ext>
+            </a:extLst>
+          </p:cNvPr>
+          <p:cNvPicPr>
+            <a:picLocks noChangeAspect="1"/>
+          </p:cNvPicPr>
+          <p:nvPr/>
+        </p:nvPicPr>
+        <p:blipFill>
+          <a:blip r:embed="rId3">
+            <a:extLst>
+              <a:ext uri="{28A0092B-C50C-407E-A947-70E740481C1C}">
+                <a14:useLocalDpi xmlns:a14="http://schemas.microsoft.com/office/drawing/2010/main" val="0"/>
+              </a:ext>
+            </a:extLst>
+          </a:blip>
+          <a:stretch>
+            <a:fillRect/>
+          </a:stretch>
+        </p:blipFill>
+        <p:spPr>
+          <a:xfrm>
+            <a:off x="4962617" y="1420427"/>
+            <a:ext cx="7229383" cy="4459682"/>
+          </a:xfrm>
+          <a:prstGeom prst="rect">
+            <a:avLst/>
+          </a:prstGeom>
+        </p:spPr>
+      </p:pic>
+      <p:sp>
+        <p:nvSpPr>
+          <p:cNvPr id="6" name="Title 1">
+            <a:extLst>
+              <a:ext uri="{FF2B5EF4-FFF2-40B4-BE49-F238E27FC236}">
+                <a16:creationId xmlns:a16="http://schemas.microsoft.com/office/drawing/2014/main" id="{91379596-E70A-4ED3-BDA9-ECBA19761A95}"/>
+              </a:ext>
+            </a:extLst>
+          </p:cNvPr>
+          <p:cNvSpPr>
+            <a:spLocks noGrp="1"/>
+          </p:cNvSpPr>
+          <p:nvPr>
+            <p:ph type="title"/>
+          </p:nvPr>
+        </p:nvSpPr>
+        <p:spPr>
+          <a:xfrm>
+            <a:off x="202377" y="355883"/>
+            <a:ext cx="4882389" cy="622008"/>
+          </a:xfrm>
+        </p:spPr>
+        <p:txBody>
+          <a:bodyPr/>
+          <a:lstStyle/>
+          <a:p>
+            <a:r>
+              <a:rPr lang="en-US" sz="4400" dirty="0"/>
+              <a:t>odontocetes</a:t>
+            </a:r>
+          </a:p>
+        </p:txBody>
+      </p:sp>
     </p:spTree>
     <p:extLst>
       <p:ext uri="{BB962C8B-B14F-4D97-AF65-F5344CB8AC3E}">
-        <p14:creationId xmlns:p14="http://schemas.microsoft.com/office/powerpoint/2010/main" val="1703409180"/>
+        <p14:creationId xmlns:p14="http://schemas.microsoft.com/office/powerpoint/2010/main" val="1947795186"/>
       </p:ext>
     </p:extLst>
   </p:cSld>
@@ -6023,10 +6200,10 @@
       </p:grpSpPr>
       <p:pic>
         <p:nvPicPr>
-          <p:cNvPr id="3" name="Picture 2">
+          <p:cNvPr id="6" name="Picture 5" descr="Chart, bar chart&#10;&#10;Description automatically generated">
             <a:extLst>
               <a:ext uri="{FF2B5EF4-FFF2-40B4-BE49-F238E27FC236}">
-                <a16:creationId xmlns:a16="http://schemas.microsoft.com/office/drawing/2014/main" id="{E091C062-444C-4039-8653-6619EB49AA34}"/>
+                <a16:creationId xmlns:a16="http://schemas.microsoft.com/office/drawing/2014/main" id="{E43C17DB-A279-2B45-B0F7-137D4239BF52}"/>
               </a:ext>
             </a:extLst>
           </p:cNvPr>
@@ -6049,20 +6226,53 @@
         </p:blipFill>
         <p:spPr>
           <a:xfrm>
-            <a:off x="0" y="0"/>
-            <a:ext cx="5528441" cy="3410402"/>
+            <a:off x="0" y="1473693"/>
+            <a:ext cx="7022237" cy="4335952"/>
           </a:xfrm>
           <a:prstGeom prst="rect">
             <a:avLst/>
           </a:prstGeom>
         </p:spPr>
       </p:pic>
+      <p:sp>
+        <p:nvSpPr>
+          <p:cNvPr id="5" name="Title 1">
+            <a:extLst>
+              <a:ext uri="{FF2B5EF4-FFF2-40B4-BE49-F238E27FC236}">
+                <a16:creationId xmlns:a16="http://schemas.microsoft.com/office/drawing/2014/main" id="{EA1AB3F6-427E-4931-B417-E53EC835FD5A}"/>
+              </a:ext>
+            </a:extLst>
+          </p:cNvPr>
+          <p:cNvSpPr>
+            <a:spLocks noGrp="1"/>
+          </p:cNvSpPr>
+          <p:nvPr>
+            <p:ph type="title"/>
+          </p:nvPr>
+        </p:nvSpPr>
+        <p:spPr>
+          <a:xfrm>
+            <a:off x="328803" y="443313"/>
+            <a:ext cx="4021255" cy="506598"/>
+          </a:xfrm>
+        </p:spPr>
+        <p:txBody>
+          <a:bodyPr/>
+          <a:lstStyle/>
+          <a:p>
+            <a:r>
+              <a:rPr lang="en-US" sz="4400" dirty="0"/>
+              <a:t>Mysticetes</a:t>
+            </a:r>
+          </a:p>
+        </p:txBody>
+      </p:sp>
       <p:pic>
         <p:nvPicPr>
-          <p:cNvPr id="4" name="Picture 3">
+          <p:cNvPr id="4" name="Picture 3" descr="Chart, bar chart&#10;&#10;Description automatically generated">
             <a:extLst>
               <a:ext uri="{FF2B5EF4-FFF2-40B4-BE49-F238E27FC236}">
-                <a16:creationId xmlns:a16="http://schemas.microsoft.com/office/drawing/2014/main" id="{37DE8069-4E43-DD42-BC25-53778FA10E10}"/>
+                <a16:creationId xmlns:a16="http://schemas.microsoft.com/office/drawing/2014/main" id="{7B29628B-3CEC-0547-A7E7-D5B85650DF29}"/>
               </a:ext>
             </a:extLst>
           </p:cNvPr>
@@ -6085,44 +6295,8 @@
         </p:blipFill>
         <p:spPr>
           <a:xfrm>
-            <a:off x="1" y="3447599"/>
-            <a:ext cx="5528440" cy="3410400"/>
-          </a:xfrm>
-          <a:prstGeom prst="rect">
-            <a:avLst/>
-          </a:prstGeom>
-        </p:spPr>
-      </p:pic>
-      <p:pic>
-        <p:nvPicPr>
-          <p:cNvPr id="5" name="Picture 4" descr="Chart, line chart&#10;&#10;Description automatically generated">
-            <a:extLst>
-              <a:ext uri="{FF2B5EF4-FFF2-40B4-BE49-F238E27FC236}">
-                <a16:creationId xmlns:a16="http://schemas.microsoft.com/office/drawing/2014/main" id="{6255CE63-46FB-E844-AACF-C54B6A78A2DE}"/>
-              </a:ext>
-            </a:extLst>
-          </p:cNvPr>
-          <p:cNvPicPr>
-            <a:picLocks noChangeAspect="1"/>
-          </p:cNvPicPr>
-          <p:nvPr/>
-        </p:nvPicPr>
-        <p:blipFill>
-          <a:blip r:embed="rId4">
-            <a:extLst>
-              <a:ext uri="{28A0092B-C50C-407E-A947-70E740481C1C}">
-                <a14:useLocalDpi xmlns:a14="http://schemas.microsoft.com/office/drawing/2010/main" val="0"/>
-              </a:ext>
-            </a:extLst>
-          </a:blip>
-          <a:stretch>
-            <a:fillRect/>
-          </a:stretch>
-        </p:blipFill>
-        <p:spPr>
-          <a:xfrm>
-            <a:off x="5559393" y="1576552"/>
-            <a:ext cx="6632606" cy="4101882"/>
+            <a:off x="5169762" y="1473692"/>
+            <a:ext cx="7022238" cy="4335953"/>
           </a:xfrm>
           <a:prstGeom prst="rect">
             <a:avLst/>
@@ -6132,7 +6306,7 @@
     </p:spTree>
     <p:extLst>
       <p:ext uri="{BB962C8B-B14F-4D97-AF65-F5344CB8AC3E}">
-        <p14:creationId xmlns:p14="http://schemas.microsoft.com/office/powerpoint/2010/main" val="1947795186"/>
+        <p14:creationId xmlns:p14="http://schemas.microsoft.com/office/powerpoint/2010/main" val="250487806"/>
       </p:ext>
     </p:extLst>
   </p:cSld>

</xml_diff>

<commit_message>
britney adding analysis stuff
</commit_message>
<xml_diff>
--- a/Output/Stranding Data Analysis.pptx
+++ b/Output/Stranding Data Analysis.pptx
@@ -213,7 +213,7 @@
           <a:p>
             <a:fld id="{50FABAFA-9D90-4B6C-95A1-503043E46FAB}" type="datetimeFigureOut">
               <a:rPr lang="en-US" smtClean="0"/>
-              <a:t>4/10/2022</a:t>
+              <a:t>4/10/22</a:t>
             </a:fld>
             <a:endParaRPr lang="en-US"/>
           </a:p>
@@ -378,7 +378,7 @@
           <a:p>
             <a:fld id="{AC15EB1F-8DE4-48C3-A804-A05846A4049F}" type="datetimeFigureOut">
               <a:rPr lang="en-US" smtClean="0"/>
-              <a:t>4/10/2022</a:t>
+              <a:t>4/10/22</a:t>
             </a:fld>
             <a:endParaRPr lang="en-US"/>
           </a:p>
@@ -970,7 +970,7 @@
           <a:p>
             <a:fld id="{CE5E0A0C-FFF2-4105-9F07-796FCC3D8DE3}" type="datetime1">
               <a:rPr lang="en-US" smtClean="0"/>
-              <a:t>4/10/2022</a:t>
+              <a:t>4/10/22</a:t>
             </a:fld>
             <a:endParaRPr lang="en-US"/>
           </a:p>
@@ -1196,7 +1196,7 @@
           <a:p>
             <a:fld id="{4A5D68D4-D432-4190-8060-492B59F98A87}" type="datetime1">
               <a:rPr lang="en-US" smtClean="0"/>
-              <a:t>4/10/2022</a:t>
+              <a:t>4/10/22</a:t>
             </a:fld>
             <a:endParaRPr lang="en-US"/>
           </a:p>
@@ -1432,7 +1432,7 @@
           <a:p>
             <a:fld id="{5AF4EF83-7D73-495D-9915-41737B990DFC}" type="datetime1">
               <a:rPr lang="en-US" smtClean="0"/>
-              <a:t>4/10/2022</a:t>
+              <a:t>4/10/22</a:t>
             </a:fld>
             <a:endParaRPr lang="en-US"/>
           </a:p>
@@ -1769,7 +1769,7 @@
           <a:p>
             <a:fld id="{73DF2905-D7E2-4171-961B-8EB802C66F9A}" type="datetime1">
               <a:rPr lang="en-US" smtClean="0"/>
-              <a:t>4/10/2022</a:t>
+              <a:t>4/10/22</a:t>
             </a:fld>
             <a:endParaRPr lang="en-US"/>
           </a:p>
@@ -2032,7 +2032,7 @@
           <a:p>
             <a:fld id="{82C1B47C-16BC-4A9F-9E6E-9D1F33DC8ABD}" type="datetime1">
               <a:rPr lang="en-US" smtClean="0"/>
-              <a:t>4/10/2022</a:t>
+              <a:t>4/10/22</a:t>
             </a:fld>
             <a:endParaRPr lang="en-US"/>
           </a:p>
@@ -2448,7 +2448,7 @@
           <a:p>
             <a:fld id="{0C073DF2-DD31-447B-89F4-CEF82A94D7A7}" type="datetime1">
               <a:rPr lang="en-US" smtClean="0"/>
-              <a:t>4/10/2022</a:t>
+              <a:t>4/10/22</a:t>
             </a:fld>
             <a:endParaRPr lang="en-US"/>
           </a:p>
@@ -2980,7 +2980,7 @@
           <a:p>
             <a:fld id="{1551BB0C-CFA8-4A1F-9AAE-D6B32E8256E7}" type="datetime1">
               <a:rPr lang="en-US" smtClean="0"/>
-              <a:t>4/10/2022</a:t>
+              <a:t>4/10/22</a:t>
             </a:fld>
             <a:endParaRPr lang="en-US"/>
           </a:p>
@@ -3118,7 +3118,7 @@
           <a:p>
             <a:fld id="{2752348D-B72F-4FC3-A127-851C5E7B3A9E}" type="datetime1">
               <a:rPr lang="en-US" smtClean="0"/>
-              <a:t>4/10/2022</a:t>
+              <a:t>4/10/22</a:t>
             </a:fld>
             <a:endParaRPr lang="en-US"/>
           </a:p>
@@ -3228,7 +3228,7 @@
           <a:p>
             <a:fld id="{D666EB1B-704A-4D5E-8D5F-456104532486}" type="datetime1">
               <a:rPr lang="en-US" smtClean="0"/>
-              <a:t>4/10/2022</a:t>
+              <a:t>4/10/22</a:t>
             </a:fld>
             <a:endParaRPr lang="en-US"/>
           </a:p>
@@ -3541,7 +3541,7 @@
           <a:p>
             <a:fld id="{D96AFBEB-CD4D-45C5-9851-D1FF1EB5AB85}" type="datetime1">
               <a:rPr lang="en-US" smtClean="0"/>
-              <a:t>4/10/2022</a:t>
+              <a:t>4/10/22</a:t>
             </a:fld>
             <a:endParaRPr lang="en-US"/>
           </a:p>
@@ -3789,7 +3789,7 @@
           <a:p>
             <a:fld id="{B285B7EB-0ACD-4247-AA3F-1B0B49109B84}" type="datetime1">
               <a:rPr lang="en-US" smtClean="0"/>
-              <a:t>4/10/2022</a:t>
+              <a:t>4/10/22</a:t>
             </a:fld>
             <a:endParaRPr lang="en-US"/>
           </a:p>
@@ -4089,7 +4089,7 @@
             <a:fld id="{8254F2F0-E062-4E41-9176-AEE9734E64AC}" type="datetime1">
               <a:rPr lang="en-US" smtClean="0"/>
               <a:pPr/>
-              <a:t>4/10/2022</a:t>
+              <a:t>4/10/22</a:t>
             </a:fld>
             <a:endParaRPr lang="en-US" dirty="0"/>
           </a:p>
@@ -4799,9 +4799,40 @@
             </a:r>
           </a:p>
           <a:p>
+            <a:pPr lvl="1"/>
             <a:r>
               <a:rPr lang="en-US" dirty="0"/>
+              <a:t>Of the 155 total </a:t>
+            </a:r>
+            <a:r>
+              <a:rPr lang="en-US" dirty="0" err="1"/>
+              <a:t>strandings</a:t>
+            </a:r>
+            <a:r>
+              <a:rPr lang="en-US" dirty="0"/>
+              <a:t>, 125 of them were within 40,000m of mean latitude and longitude, and 20 of them were within 40,000 - 60,000m.</a:t>
+            </a:r>
+          </a:p>
+          <a:p>
+            <a:r>
+              <a:rPr lang="en-US" dirty="0" err="1"/>
               <a:t>Mysticetes</a:t>
+            </a:r>
+            <a:endParaRPr lang="en-US" dirty="0"/>
+          </a:p>
+          <a:p>
+            <a:pPr lvl="1"/>
+            <a:r>
+              <a:rPr lang="en-US" dirty="0"/>
+              <a:t>Of the 50 total </a:t>
+            </a:r>
+            <a:r>
+              <a:rPr lang="en-US" dirty="0" err="1"/>
+              <a:t>strandings</a:t>
+            </a:r>
+            <a:r>
+              <a:rPr lang="en-US" dirty="0"/>
+              <a:t>, 44 of them were within 40,000m of mean latitude and longitude </a:t>
             </a:r>
           </a:p>
         </p:txBody>
@@ -4900,12 +4931,12 @@
         <p:spPr>
           <a:xfrm>
             <a:off x="812800" y="939801"/>
-            <a:ext cx="10566400" cy="4775199"/>
+            <a:ext cx="10566400" cy="5372869"/>
           </a:xfrm>
         </p:spPr>
         <p:txBody>
           <a:bodyPr>
-            <a:normAutofit fontScale="77500" lnSpcReduction="20000"/>
+            <a:normAutofit fontScale="70000" lnSpcReduction="20000"/>
           </a:bodyPr>
           <a:lstStyle/>
           <a:p>
@@ -4969,9 +5000,73 @@
             </a:r>
           </a:p>
           <a:p>
-            <a:r>
-              <a:rPr lang="en-US" sz="2400" dirty="0"/>
+            <a:pPr lvl="2"/>
+            <a:r>
+              <a:rPr lang="en-US" sz="1900" dirty="0"/>
+              <a:t>Total number of </a:t>
+            </a:r>
+            <a:r>
+              <a:rPr lang="en-US" sz="1900" dirty="0" err="1"/>
+              <a:t>strandings</a:t>
+            </a:r>
+            <a:r>
+              <a:rPr lang="en-US" sz="1900" dirty="0"/>
+              <a:t> have increased over the years</a:t>
+            </a:r>
+          </a:p>
+          <a:p>
+            <a:pPr lvl="2"/>
+            <a:r>
+              <a:rPr lang="en-US" sz="1900" dirty="0" err="1"/>
+              <a:t>Strandings</a:t>
+            </a:r>
+            <a:r>
+              <a:rPr lang="en-US" sz="1900" dirty="0"/>
+              <a:t> appear regularly over the months</a:t>
+            </a:r>
+          </a:p>
+          <a:p>
+            <a:r>
+              <a:rPr lang="en-US" sz="2400" dirty="0" err="1"/>
               <a:t>Mysticetes</a:t>
+            </a:r>
+            <a:endParaRPr lang="en-US" sz="2400" dirty="0"/>
+          </a:p>
+          <a:p>
+            <a:pPr lvl="2"/>
+            <a:r>
+              <a:rPr lang="en-US" sz="1900" dirty="0"/>
+              <a:t>Concentrated during months of June and July</a:t>
+            </a:r>
+          </a:p>
+          <a:p>
+            <a:pPr lvl="2"/>
+            <a:r>
+              <a:rPr lang="en-US" sz="1900" dirty="0"/>
+              <a:t>Much fewer total </a:t>
+            </a:r>
+            <a:r>
+              <a:rPr lang="en-US" sz="1900" dirty="0" err="1"/>
+              <a:t>strandings</a:t>
+            </a:r>
+            <a:r>
+              <a:rPr lang="en-US" sz="1900" dirty="0"/>
+              <a:t> over the study period</a:t>
+            </a:r>
+          </a:p>
+          <a:p>
+            <a:pPr lvl="2"/>
+            <a:r>
+              <a:rPr lang="en-US" sz="1900" dirty="0"/>
+              <a:t>Increased amounts of </a:t>
+            </a:r>
+            <a:r>
+              <a:rPr lang="en-US" sz="1900" dirty="0" err="1"/>
+              <a:t>stradings</a:t>
+            </a:r>
+            <a:r>
+              <a:rPr lang="en-US" sz="1900" dirty="0"/>
+              <a:t> after the year 2000</a:t>
             </a:r>
           </a:p>
           <a:p>

</xml_diff>

<commit_message>
removed text box outline
</commit_message>
<xml_diff>
--- a/Output/Stranding Data Analysis.pptx
+++ b/Output/Stranding Data Analysis.pptx
@@ -5796,12 +5796,7 @@
           </a:prstGeom>
           <a:noFill/>
           <a:ln>
-            <a:solidFill>
-              <a:schemeClr val="accent1">
-                <a:lumMod val="20000"/>
-                <a:lumOff val="80000"/>
-              </a:schemeClr>
-            </a:solidFill>
+            <a:noFill/>
           </a:ln>
         </p:spPr>
         <p:txBody>
@@ -6194,12 +6189,7 @@
           </a:prstGeom>
           <a:noFill/>
           <a:ln>
-            <a:solidFill>
-              <a:schemeClr val="accent1">
-                <a:lumMod val="20000"/>
-                <a:lumOff val="80000"/>
-              </a:schemeClr>
-            </a:solidFill>
+            <a:noFill/>
           </a:ln>
         </p:spPr>
         <p:txBody>
@@ -6404,12 +6394,7 @@
           </a:prstGeom>
           <a:noFill/>
           <a:ln>
-            <a:solidFill>
-              <a:schemeClr val="accent1">
-                <a:lumMod val="20000"/>
-                <a:lumOff val="80000"/>
-              </a:schemeClr>
-            </a:solidFill>
+            <a:noFill/>
           </a:ln>
         </p:spPr>
         <p:txBody>

</xml_diff>